<commit_message>
Update 1.7 and 1.8 documentation.pptx
</commit_message>
<xml_diff>
--- a/1.7 and 1.8 documentation.pptx
+++ b/1.7 and 1.8 documentation.pptx
@@ -168,7 +168,7 @@
     <p1510:client id="{C1E24E78-1F28-6D4A-E012-468CE686344A}" v="1" dt="2022-04-13T23:00:33.548"/>
     <p1510:client id="{E462C1EF-32F1-1F33-874C-C2D0A433766B}" v="80" dt="2022-04-10T23:16:00.532"/>
     <p1510:client id="{E73AC928-7D87-5D94-5CF7-49334421705B}" v="867" dt="2022-04-13T07:29:44.742"/>
-    <p1510:client id="{E92B7BDB-88D2-56FD-ABD2-83DA0A067A71}" v="15" dt="2022-05-02T21:14:29.789"/>
+    <p1510:client id="{E92B7BDB-88D2-56FD-ABD2-83DA0A067A71}" v="16" dt="2022-05-02T21:17:51.277"/>
     <p1510:client id="{ED384A0D-67FC-3DCC-741F-8364AA4B3505}" v="1579" dt="2022-04-13T02:14:33.505"/>
     <p1510:client id="{ED89BA52-C93F-C9E4-3561-9BF3A71FD8F3}" v="869" dt="2022-04-04T21:08:20.274"/>
     <p1510:client id="{FE9DF4E4-253E-F442-8B51-D9CEDF13A1AF}" v="7" dt="2022-03-20T22:24:35.899"/>
@@ -2601,7 +2601,7 @@
   <pc:docChgLst>
     <pc:chgData name="Jireh Tseng" userId="S::tsengj@middleton.school.nz::eefb979d-fc0d-4dd5-ae9a-91b2ece0a753" providerId="AD" clId="Web-{E92B7BDB-88D2-56FD-ABD2-83DA0A067A71}"/>
     <pc:docChg chg="modSld">
-      <pc:chgData name="Jireh Tseng" userId="S::tsengj@middleton.school.nz::eefb979d-fc0d-4dd5-ae9a-91b2ece0a753" providerId="AD" clId="Web-{E92B7BDB-88D2-56FD-ABD2-83DA0A067A71}" dt="2022-05-02T21:14:29.789" v="14" actId="20577"/>
+      <pc:chgData name="Jireh Tseng" userId="S::tsengj@middleton.school.nz::eefb979d-fc0d-4dd5-ae9a-91b2ece0a753" providerId="AD" clId="Web-{E92B7BDB-88D2-56FD-ABD2-83DA0A067A71}" dt="2022-05-02T21:17:51.277" v="15" actId="20577"/>
       <pc:docMkLst>
         <pc:docMk/>
       </pc:docMkLst>
@@ -2685,13 +2685,13 @@
         </pc:picChg>
       </pc:sldChg>
       <pc:sldChg chg="modSp">
-        <pc:chgData name="Jireh Tseng" userId="S::tsengj@middleton.school.nz::eefb979d-fc0d-4dd5-ae9a-91b2ece0a753" providerId="AD" clId="Web-{E92B7BDB-88D2-56FD-ABD2-83DA0A067A71}" dt="2022-05-02T21:14:29.789" v="14" actId="20577"/>
+        <pc:chgData name="Jireh Tseng" userId="S::tsengj@middleton.school.nz::eefb979d-fc0d-4dd5-ae9a-91b2ece0a753" providerId="AD" clId="Web-{E92B7BDB-88D2-56FD-ABD2-83DA0A067A71}" dt="2022-05-02T21:17:51.277" v="15" actId="20577"/>
         <pc:sldMkLst>
           <pc:docMk/>
           <pc:sldMk cId="3838895173" sldId="258"/>
         </pc:sldMkLst>
         <pc:spChg chg="mod">
-          <ac:chgData name="Jireh Tseng" userId="S::tsengj@middleton.school.nz::eefb979d-fc0d-4dd5-ae9a-91b2ece0a753" providerId="AD" clId="Web-{E92B7BDB-88D2-56FD-ABD2-83DA0A067A71}" dt="2022-05-02T21:14:29.789" v="14" actId="20577"/>
+          <ac:chgData name="Jireh Tseng" userId="S::tsengj@middleton.school.nz::eefb979d-fc0d-4dd5-ae9a-91b2ece0a753" providerId="AD" clId="Web-{E92B7BDB-88D2-56FD-ABD2-83DA0A067A71}" dt="2022-05-02T21:17:51.277" v="15" actId="20577"/>
           <ac:spMkLst>
             <pc:docMk/>
             <pc:sldMk cId="3838895173" sldId="258"/>
@@ -17810,14 +17810,14 @@
               <a:buNone/>
             </a:pPr>
             <a:r>
-              <a:rPr lang="en-NZ" sz="2000" b="1">
+              <a:rPr lang="en-NZ" sz="2000" b="1" dirty="0">
                 <a:solidFill>
                   <a:srgbClr val="274E13"/>
                 </a:solidFill>
               </a:rPr>
               <a:t>Link to GitHub Repository: </a:t>
             </a:r>
-            <a:endParaRPr lang="en-NZ" sz="2000">
+            <a:endParaRPr lang="en-NZ" sz="2000" dirty="0">
               <a:solidFill>
                 <a:srgbClr val="000000"/>
               </a:solidFill>
@@ -17866,25 +17866,17 @@
                   <a:srgbClr val="274E13"/>
                 </a:solidFill>
               </a:rPr>
-              <a:t>Links to Trello board / project management </a:t>
+              <a:t>Links to Trello board / project management tools: </a:t>
             </a:r>
             <a:r>
-              <a:rPr lang="en-NZ" sz="2000" b="1">
-                <a:solidFill>
-                  <a:srgbClr val="274E13"/>
-                </a:solidFill>
-              </a:rPr>
-              <a:t>tools: </a:t>
-            </a:r>
-            <a:r>
-              <a:rPr lang="en-NZ" sz="2000">
+              <a:rPr lang="en-NZ" sz="2000" dirty="0">
                 <a:ea typeface="+mn-lt"/>
                 <a:cs typeface="+mn-lt"/>
                 <a:hlinkClick r:id="rId2"/>
               </a:rPr>
               <a:t>https://trello.com/b/oRaulPpn/lucky-unicorn</a:t>
             </a:r>
-            <a:endParaRPr lang="en-NZ" sz="2000">
+            <a:endParaRPr lang="en-NZ" sz="2000" dirty="0">
               <a:ea typeface="+mn-lt"/>
               <a:cs typeface="+mn-lt"/>
             </a:endParaRPr>
@@ -17924,14 +17916,14 @@
               <a:buNone/>
             </a:pPr>
             <a:r>
-              <a:rPr lang="en-NZ" sz="2000" b="1">
+              <a:rPr lang="en-NZ" sz="2000" b="1" dirty="0">
                 <a:solidFill>
                   <a:srgbClr val="274E13"/>
                 </a:solidFill>
               </a:rPr>
               <a:t>Link to final version of your program: </a:t>
             </a:r>
-            <a:endParaRPr lang="en-NZ" sz="2000">
+            <a:endParaRPr lang="en-NZ" sz="2000" dirty="0">
               <a:solidFill>
                 <a:srgbClr val="000000"/>
               </a:solidFill>

</xml_diff>